<commit_message>
add 4 nlp paper & ffm
</commit_message>
<xml_diff>
--- a/advertisement/广告tag兴趣预测_0610.pptx
+++ b/advertisement/广告tag兴趣预测_0610.pptx
@@ -221,7 +221,7 @@
           <a:p>
             <a:fld id="{59B7E053-8799-4FAB-88DB-F5BD6B611F36}" type="datetimeFigureOut">
               <a:rPr lang="zh-CN" altLang="en-US" smtClean="0"/>
-              <a:t>2019/6/13</a:t>
+              <a:t>2019/7/10</a:t>
             </a:fld>
             <a:endParaRPr lang="zh-CN" altLang="en-US"/>
           </a:p>
@@ -8659,7 +8659,7 @@
           <a:p>
             <a:fld id="{317175BE-EDAA-4FEB-823E-45675E4FF017}" type="datetimeFigureOut">
               <a:rPr lang="zh-CN" altLang="en-US" smtClean="0"/>
-              <a:t>2019/6/13</a:t>
+              <a:t>2019/7/10</a:t>
             </a:fld>
             <a:endParaRPr lang="zh-CN" altLang="en-US"/>
           </a:p>
@@ -8857,7 +8857,7 @@
           <a:p>
             <a:fld id="{317175BE-EDAA-4FEB-823E-45675E4FF017}" type="datetimeFigureOut">
               <a:rPr lang="zh-CN" altLang="en-US" smtClean="0"/>
-              <a:t>2019/6/13</a:t>
+              <a:t>2019/7/10</a:t>
             </a:fld>
             <a:endParaRPr lang="zh-CN" altLang="en-US"/>
           </a:p>
@@ -9065,7 +9065,7 @@
           <a:p>
             <a:fld id="{317175BE-EDAA-4FEB-823E-45675E4FF017}" type="datetimeFigureOut">
               <a:rPr lang="zh-CN" altLang="en-US" smtClean="0"/>
-              <a:t>2019/6/13</a:t>
+              <a:t>2019/7/10</a:t>
             </a:fld>
             <a:endParaRPr lang="zh-CN" altLang="en-US"/>
           </a:p>
@@ -9263,7 +9263,7 @@
           <a:p>
             <a:fld id="{317175BE-EDAA-4FEB-823E-45675E4FF017}" type="datetimeFigureOut">
               <a:rPr lang="zh-CN" altLang="en-US" smtClean="0"/>
-              <a:t>2019/6/13</a:t>
+              <a:t>2019/7/10</a:t>
             </a:fld>
             <a:endParaRPr lang="zh-CN" altLang="en-US"/>
           </a:p>
@@ -9538,7 +9538,7 @@
           <a:p>
             <a:fld id="{317175BE-EDAA-4FEB-823E-45675E4FF017}" type="datetimeFigureOut">
               <a:rPr lang="zh-CN" altLang="en-US" smtClean="0"/>
-              <a:t>2019/6/13</a:t>
+              <a:t>2019/7/10</a:t>
             </a:fld>
             <a:endParaRPr lang="zh-CN" altLang="en-US"/>
           </a:p>
@@ -9803,7 +9803,7 @@
           <a:p>
             <a:fld id="{317175BE-EDAA-4FEB-823E-45675E4FF017}" type="datetimeFigureOut">
               <a:rPr lang="zh-CN" altLang="en-US" smtClean="0"/>
-              <a:t>2019/6/13</a:t>
+              <a:t>2019/7/10</a:t>
             </a:fld>
             <a:endParaRPr lang="zh-CN" altLang="en-US"/>
           </a:p>
@@ -10215,7 +10215,7 @@
           <a:p>
             <a:fld id="{317175BE-EDAA-4FEB-823E-45675E4FF017}" type="datetimeFigureOut">
               <a:rPr lang="zh-CN" altLang="en-US" smtClean="0"/>
-              <a:t>2019/6/13</a:t>
+              <a:t>2019/7/10</a:t>
             </a:fld>
             <a:endParaRPr lang="zh-CN" altLang="en-US"/>
           </a:p>
@@ -10356,7 +10356,7 @@
           <a:p>
             <a:fld id="{317175BE-EDAA-4FEB-823E-45675E4FF017}" type="datetimeFigureOut">
               <a:rPr lang="zh-CN" altLang="en-US" smtClean="0"/>
-              <a:t>2019/6/13</a:t>
+              <a:t>2019/7/10</a:t>
             </a:fld>
             <a:endParaRPr lang="zh-CN" altLang="en-US"/>
           </a:p>
@@ -10469,7 +10469,7 @@
           <a:p>
             <a:fld id="{317175BE-EDAA-4FEB-823E-45675E4FF017}" type="datetimeFigureOut">
               <a:rPr lang="zh-CN" altLang="en-US" smtClean="0"/>
-              <a:t>2019/6/13</a:t>
+              <a:t>2019/7/10</a:t>
             </a:fld>
             <a:endParaRPr lang="zh-CN" altLang="en-US"/>
           </a:p>
@@ -10780,7 +10780,7 @@
           <a:p>
             <a:fld id="{317175BE-EDAA-4FEB-823E-45675E4FF017}" type="datetimeFigureOut">
               <a:rPr lang="zh-CN" altLang="en-US" smtClean="0"/>
-              <a:t>2019/6/13</a:t>
+              <a:t>2019/7/10</a:t>
             </a:fld>
             <a:endParaRPr lang="zh-CN" altLang="en-US"/>
           </a:p>
@@ -11068,7 +11068,7 @@
           <a:p>
             <a:fld id="{317175BE-EDAA-4FEB-823E-45675E4FF017}" type="datetimeFigureOut">
               <a:rPr lang="zh-CN" altLang="en-US" smtClean="0"/>
-              <a:t>2019/6/13</a:t>
+              <a:t>2019/7/10</a:t>
             </a:fld>
             <a:endParaRPr lang="zh-CN" altLang="en-US"/>
           </a:p>
@@ -11309,7 +11309,7 @@
           <a:p>
             <a:fld id="{317175BE-EDAA-4FEB-823E-45675E4FF017}" type="datetimeFigureOut">
               <a:rPr lang="zh-CN" altLang="en-US" smtClean="0"/>
-              <a:t>2019/6/13</a:t>
+              <a:t>2019/7/10</a:t>
             </a:fld>
             <a:endParaRPr lang="zh-CN" altLang="en-US"/>
           </a:p>

</xml_diff>